<commit_message>
updated readme and added more images
</commit_message>
<xml_diff>
--- a/Customer Segmentation of Olist Ecommerce Customers in Sao.pptx
+++ b/Customer Segmentation of Olist Ecommerce Customers in Sao.pptx
@@ -2577,7 +2577,7 @@
         <a:p>
           <a:r>
             <a:rPr lang="en-GB" b="0" i="0" dirty="0"/>
-            <a:t>At the date of the last data within the data set , </a:t>
+            <a:t>At the date of the last data  within the data set (17 September 2018)  , </a:t>
           </a:r>
           <a:r>
             <a:rPr lang="en-GB" b="0" i="0" dirty="0" err="1"/>
@@ -3320,7 +3320,7 @@
       <dsp:spPr>
         <a:xfrm>
           <a:off x="0" y="0"/>
-          <a:ext cx="4998128" cy="737437"/>
+          <a:ext cx="4998128" cy="715090"/>
         </a:xfrm>
         <a:prstGeom prst="roundRect">
           <a:avLst/>
@@ -3362,12 +3362,12 @@
         </a:fontRef>
       </dsp:style>
       <dsp:txBody>
-        <a:bodyPr spcFirstLastPara="0" vert="horz" wrap="square" lIns="114300" tIns="114300" rIns="114300" bIns="114300" numCol="1" spcCol="1270" anchor="ctr" anchorCtr="0">
+        <a:bodyPr spcFirstLastPara="0" vert="horz" wrap="square" lIns="110490" tIns="110490" rIns="110490" bIns="110490" numCol="1" spcCol="1270" anchor="ctr" anchorCtr="0">
           <a:noAutofit/>
         </a:bodyPr>
         <a:lstStyle/>
         <a:p>
-          <a:pPr marL="0" lvl="0" indent="0" algn="l" defTabSz="1333500">
+          <a:pPr marL="0" lvl="0" indent="0" algn="l" defTabSz="1289050">
             <a:lnSpc>
               <a:spcPct val="90000"/>
             </a:lnSpc>
@@ -3380,15 +3380,15 @@
             <a:buNone/>
           </a:pPr>
           <a:r>
-            <a:rPr lang="en-US" sz="3000" kern="1200" dirty="0"/>
+            <a:rPr lang="en-US" sz="2900" kern="1200" dirty="0"/>
             <a:t>Funding</a:t>
           </a:r>
-          <a:endParaRPr lang="en-ID" sz="3000" kern="1200" dirty="0"/>
+          <a:endParaRPr lang="en-ID" sz="2900" kern="1200" dirty="0"/>
         </a:p>
       </dsp:txBody>
       <dsp:txXfrm>
-        <a:off x="35999" y="35999"/>
-        <a:ext cx="4926130" cy="665439"/>
+        <a:off x="34908" y="34908"/>
+        <a:ext cx="4928312" cy="645274"/>
       </dsp:txXfrm>
     </dsp:sp>
     <dsp:sp modelId="{6C021367-A5E8-4BF6-847B-6AABA00C8730}">
@@ -3398,8 +3398,8 @@
       </dsp:nvSpPr>
       <dsp:spPr>
         <a:xfrm>
-          <a:off x="0" y="853009"/>
-          <a:ext cx="4998128" cy="3825360"/>
+          <a:off x="0" y="734195"/>
+          <a:ext cx="4998128" cy="4040640"/>
         </a:xfrm>
         <a:prstGeom prst="rect">
           <a:avLst/>
@@ -3423,7 +3423,7 @@
         <a:fontRef idx="minor"/>
       </dsp:style>
       <dsp:txBody>
-        <a:bodyPr spcFirstLastPara="0" vert="horz" wrap="square" lIns="158691" tIns="38100" rIns="213360" bIns="38100" numCol="1" spcCol="1270" anchor="t" anchorCtr="0">
+        <a:bodyPr spcFirstLastPara="0" vert="horz" wrap="square" lIns="158691" tIns="36830" rIns="206248" bIns="36830" numCol="1" spcCol="1270" anchor="t" anchorCtr="0">
           <a:noAutofit/>
         </a:bodyPr>
         <a:lstStyle/>
@@ -3442,7 +3442,7 @@
           </a:pPr>
           <a:r>
             <a:rPr lang="en-GB" sz="2300" b="0" i="0" kern="1200" dirty="0"/>
-            <a:t>At the date of the last data within the data set , </a:t>
+            <a:t>At the date of the last data  within the data set (17 September 2018)  , </a:t>
           </a:r>
           <a:r>
             <a:rPr lang="en-GB" sz="2300" b="0" i="0" kern="1200" dirty="0" err="1"/>
@@ -3471,8 +3471,8 @@
         </a:p>
       </dsp:txBody>
       <dsp:txXfrm>
-        <a:off x="0" y="853009"/>
-        <a:ext cx="4998128" cy="3825360"/>
+        <a:off x="0" y="734195"/>
+        <a:ext cx="4998128" cy="4040640"/>
       </dsp:txXfrm>
     </dsp:sp>
   </dsp:spTree>
@@ -7993,7 +7993,7 @@
           <a:p>
             <a:fld id="{396F1043-5388-4FB7-81D2-B8A6F681925A}" type="datetimeFigureOut">
               <a:rPr lang="en-ID" smtClean="0"/>
-              <a:t>18/04/2021</a:t>
+              <a:t>03/08/2021</a:t>
             </a:fld>
             <a:endParaRPr lang="en-ID"/>
           </a:p>
@@ -11894,7 +11894,7 @@
           <a:p>
             <a:fld id="{9306BC65-BAA6-4E58-A43E-C81176167CD9}" type="datetimeFigureOut">
               <a:rPr lang="en-ID" smtClean="0"/>
-              <a:t>18/04/2021</a:t>
+              <a:t>03/08/2021</a:t>
             </a:fld>
             <a:endParaRPr lang="en-ID"/>
           </a:p>
@@ -12102,7 +12102,7 @@
           <a:p>
             <a:fld id="{9306BC65-BAA6-4E58-A43E-C81176167CD9}" type="datetimeFigureOut">
               <a:rPr lang="en-ID" smtClean="0"/>
-              <a:t>18/04/2021</a:t>
+              <a:t>03/08/2021</a:t>
             </a:fld>
             <a:endParaRPr lang="en-ID"/>
           </a:p>
@@ -12358,7 +12358,7 @@
           <a:p>
             <a:fld id="{9306BC65-BAA6-4E58-A43E-C81176167CD9}" type="datetimeFigureOut">
               <a:rPr lang="en-ID" smtClean="0"/>
-              <a:t>18/04/2021</a:t>
+              <a:t>03/08/2021</a:t>
             </a:fld>
             <a:endParaRPr lang="en-ID"/>
           </a:p>
@@ -12568,7 +12568,7 @@
           <a:p>
             <a:fld id="{9306BC65-BAA6-4E58-A43E-C81176167CD9}" type="datetimeFigureOut">
               <a:rPr lang="en-ID" smtClean="0"/>
-              <a:t>18/04/2021</a:t>
+              <a:t>03/08/2021</a:t>
             </a:fld>
             <a:endParaRPr lang="en-ID"/>
           </a:p>
@@ -12768,7 +12768,7 @@
           <a:p>
             <a:fld id="{9306BC65-BAA6-4E58-A43E-C81176167CD9}" type="datetimeFigureOut">
               <a:rPr lang="en-ID" smtClean="0"/>
-              <a:t>18/04/2021</a:t>
+              <a:t>03/08/2021</a:t>
             </a:fld>
             <a:endParaRPr lang="en-ID"/>
           </a:p>
@@ -13044,7 +13044,7 @@
           <a:p>
             <a:fld id="{9306BC65-BAA6-4E58-A43E-C81176167CD9}" type="datetimeFigureOut">
               <a:rPr lang="en-ID" smtClean="0"/>
-              <a:t>18/04/2021</a:t>
+              <a:t>03/08/2021</a:t>
             </a:fld>
             <a:endParaRPr lang="en-ID"/>
           </a:p>
@@ -13312,7 +13312,7 @@
           <a:p>
             <a:fld id="{9306BC65-BAA6-4E58-A43E-C81176167CD9}" type="datetimeFigureOut">
               <a:rPr lang="en-ID" smtClean="0"/>
-              <a:t>18/04/2021</a:t>
+              <a:t>03/08/2021</a:t>
             </a:fld>
             <a:endParaRPr lang="en-ID"/>
           </a:p>
@@ -13727,7 +13727,7 @@
           <a:p>
             <a:fld id="{9306BC65-BAA6-4E58-A43E-C81176167CD9}" type="datetimeFigureOut">
               <a:rPr lang="en-ID" smtClean="0"/>
-              <a:t>18/04/2021</a:t>
+              <a:t>03/08/2021</a:t>
             </a:fld>
             <a:endParaRPr lang="en-ID"/>
           </a:p>
@@ -13869,7 +13869,7 @@
           <a:p>
             <a:fld id="{9306BC65-BAA6-4E58-A43E-C81176167CD9}" type="datetimeFigureOut">
               <a:rPr lang="en-ID" smtClean="0"/>
-              <a:t>18/04/2021</a:t>
+              <a:t>03/08/2021</a:t>
             </a:fld>
             <a:endParaRPr lang="en-ID"/>
           </a:p>
@@ -13982,7 +13982,7 @@
           <a:p>
             <a:fld id="{9306BC65-BAA6-4E58-A43E-C81176167CD9}" type="datetimeFigureOut">
               <a:rPr lang="en-ID" smtClean="0"/>
-              <a:t>18/04/2021</a:t>
+              <a:t>03/08/2021</a:t>
             </a:fld>
             <a:endParaRPr lang="en-ID"/>
           </a:p>
@@ -14295,7 +14295,7 @@
           <a:p>
             <a:fld id="{9306BC65-BAA6-4E58-A43E-C81176167CD9}" type="datetimeFigureOut">
               <a:rPr lang="en-ID" smtClean="0"/>
-              <a:t>18/04/2021</a:t>
+              <a:t>03/08/2021</a:t>
             </a:fld>
             <a:endParaRPr lang="en-ID"/>
           </a:p>
@@ -14481,7 +14481,7 @@
           <a:p>
             <a:fld id="{9306BC65-BAA6-4E58-A43E-C81176167CD9}" type="datetimeFigureOut">
               <a:rPr lang="en-ID" smtClean="0"/>
-              <a:t>18/04/2021</a:t>
+              <a:t>03/08/2021</a:t>
             </a:fld>
             <a:endParaRPr lang="en-ID"/>
           </a:p>
@@ -14758,7 +14758,7 @@
           <a:p>
             <a:fld id="{9306BC65-BAA6-4E58-A43E-C81176167CD9}" type="datetimeFigureOut">
               <a:rPr lang="en-ID" smtClean="0"/>
-              <a:t>18/04/2021</a:t>
+              <a:t>03/08/2021</a:t>
             </a:fld>
             <a:endParaRPr lang="en-ID"/>
           </a:p>
@@ -14958,7 +14958,7 @@
           <a:p>
             <a:fld id="{9306BC65-BAA6-4E58-A43E-C81176167CD9}" type="datetimeFigureOut">
               <a:rPr lang="en-ID" smtClean="0"/>
-              <a:t>18/04/2021</a:t>
+              <a:t>03/08/2021</a:t>
             </a:fld>
             <a:endParaRPr lang="en-ID"/>
           </a:p>
@@ -15168,7 +15168,7 @@
           <a:p>
             <a:fld id="{9306BC65-BAA6-4E58-A43E-C81176167CD9}" type="datetimeFigureOut">
               <a:rPr lang="en-ID" smtClean="0"/>
-              <a:t>18/04/2021</a:t>
+              <a:t>03/08/2021</a:t>
             </a:fld>
             <a:endParaRPr lang="en-ID"/>
           </a:p>
@@ -15523,7 +15523,7 @@
           <a:p>
             <a:fld id="{9306BC65-BAA6-4E58-A43E-C81176167CD9}" type="datetimeFigureOut">
               <a:rPr lang="en-ID" smtClean="0"/>
-              <a:t>18/04/2021</a:t>
+              <a:t>03/08/2021</a:t>
             </a:fld>
             <a:endParaRPr lang="en-ID"/>
           </a:p>
@@ -15798,7 +15798,7 @@
           <a:p>
             <a:fld id="{9306BC65-BAA6-4E58-A43E-C81176167CD9}" type="datetimeFigureOut">
               <a:rPr lang="en-ID" smtClean="0"/>
-              <a:t>18/04/2021</a:t>
+              <a:t>03/08/2021</a:t>
             </a:fld>
             <a:endParaRPr lang="en-ID"/>
           </a:p>
@@ -16177,7 +16177,7 @@
           <a:p>
             <a:fld id="{9306BC65-BAA6-4E58-A43E-C81176167CD9}" type="datetimeFigureOut">
               <a:rPr lang="en-ID" smtClean="0"/>
-              <a:t>18/04/2021</a:t>
+              <a:t>03/08/2021</a:t>
             </a:fld>
             <a:endParaRPr lang="en-ID"/>
           </a:p>
@@ -16295,7 +16295,7 @@
           <a:p>
             <a:fld id="{9306BC65-BAA6-4E58-A43E-C81176167CD9}" type="datetimeFigureOut">
               <a:rPr lang="en-ID" smtClean="0"/>
-              <a:t>18/04/2021</a:t>
+              <a:t>03/08/2021</a:t>
             </a:fld>
             <a:endParaRPr lang="en-ID"/>
           </a:p>
@@ -16466,7 +16466,7 @@
           <a:p>
             <a:fld id="{9306BC65-BAA6-4E58-A43E-C81176167CD9}" type="datetimeFigureOut">
               <a:rPr lang="en-ID" smtClean="0"/>
-              <a:t>18/04/2021</a:t>
+              <a:t>03/08/2021</a:t>
             </a:fld>
             <a:endParaRPr lang="en-ID"/>
           </a:p>
@@ -16820,7 +16820,7 @@
           <a:p>
             <a:fld id="{9306BC65-BAA6-4E58-A43E-C81176167CD9}" type="datetimeFigureOut">
               <a:rPr lang="en-ID" smtClean="0"/>
-              <a:t>18/04/2021</a:t>
+              <a:t>03/08/2021</a:t>
             </a:fld>
             <a:endParaRPr lang="en-ID"/>
           </a:p>
@@ -17202,7 +17202,7 @@
           <a:p>
             <a:fld id="{9306BC65-BAA6-4E58-A43E-C81176167CD9}" type="datetimeFigureOut">
               <a:rPr lang="en-ID" smtClean="0"/>
-              <a:t>18/04/2021</a:t>
+              <a:t>03/08/2021</a:t>
             </a:fld>
             <a:endParaRPr lang="en-ID"/>
           </a:p>
@@ -17489,7 +17489,7 @@
           <a:p>
             <a:fld id="{9306BC65-BAA6-4E58-A43E-C81176167CD9}" type="datetimeFigureOut">
               <a:rPr lang="en-ID" smtClean="0"/>
-              <a:t>18/04/2021</a:t>
+              <a:t>03/08/2021</a:t>
             </a:fld>
             <a:endParaRPr lang="en-ID"/>
           </a:p>
@@ -18166,7 +18166,7 @@
           <a:p>
             <a:fld id="{9306BC65-BAA6-4E58-A43E-C81176167CD9}" type="datetimeFigureOut">
               <a:rPr lang="en-ID" smtClean="0"/>
-              <a:t>18/04/2021</a:t>
+              <a:t>03/08/2021</a:t>
             </a:fld>
             <a:endParaRPr lang="en-ID"/>
           </a:p>
@@ -18762,7 +18762,7 @@
           <p:nvPr>
             <p:extLst>
               <p:ext uri="{D42A27DB-BD31-4B8C-83A1-F6EECF244321}">
-                <p14:modId xmlns:p14="http://schemas.microsoft.com/office/powerpoint/2010/main" val="2357402621"/>
+                <p14:modId xmlns:p14="http://schemas.microsoft.com/office/powerpoint/2010/main" val="2497241112"/>
               </p:ext>
             </p:extLst>
           </p:nvPr>
@@ -23424,7 +23424,7 @@
                 </a:solidFill>
                 <a:latin typeface="Times New Roman" panose="02020603050405020304" pitchFamily="18" charset="0"/>
               </a:rPr>
-              <a:t>Acquiring a new customer is 5 to 25 times more expensive than retaining an existing one. On the other hand, studies by Bain &amp; Company, along with Earl Sasser of the Harvard Business School, have shown that a 5% increase in customer retention can lead to an increase in profits between 25 and 95%.). </a:t>
+              <a:t>Acquiring a new customer is 5 to 25 times more expensive than retaining an existing one. On the other hand, studies by Bain &amp; Company, along with Earl Sasser of the Harvard Business School, have shown that a 5% increase in customer retention can lead to an increase in profits between 25 and 95%. </a:t>
             </a:r>
           </a:p>
           <a:p>

</xml_diff>